<commit_message>
erste änderungen nach Feedback
</commit_message>
<xml_diff>
--- a/Vortrag/Vortrag.pptx
+++ b/Vortrag/Vortrag.pptx
@@ -5,26 +5,25 @@
     <p:sldMasterId id="2147483676" r:id="rId1"/>
   </p:sldMasterIdLst>
   <p:notesMasterIdLst>
-    <p:notesMasterId r:id="rId16"/>
+    <p:notesMasterId r:id="rId15"/>
   </p:notesMasterIdLst>
   <p:handoutMasterIdLst>
-    <p:handoutMasterId r:id="rId17"/>
+    <p:handoutMasterId r:id="rId16"/>
   </p:handoutMasterIdLst>
   <p:sldIdLst>
     <p:sldId id="256" r:id="rId2"/>
-    <p:sldId id="264" r:id="rId3"/>
-    <p:sldId id="271" r:id="rId4"/>
-    <p:sldId id="274" r:id="rId5"/>
-    <p:sldId id="272" r:id="rId6"/>
-    <p:sldId id="275" r:id="rId7"/>
-    <p:sldId id="283" r:id="rId8"/>
-    <p:sldId id="277" r:id="rId9"/>
-    <p:sldId id="278" r:id="rId10"/>
+    <p:sldId id="271" r:id="rId3"/>
+    <p:sldId id="274" r:id="rId4"/>
+    <p:sldId id="272" r:id="rId5"/>
+    <p:sldId id="275" r:id="rId6"/>
+    <p:sldId id="283" r:id="rId7"/>
+    <p:sldId id="277" r:id="rId8"/>
+    <p:sldId id="278" r:id="rId9"/>
+    <p:sldId id="279" r:id="rId10"/>
     <p:sldId id="273" r:id="rId11"/>
-    <p:sldId id="279" r:id="rId12"/>
-    <p:sldId id="280" r:id="rId13"/>
-    <p:sldId id="281" r:id="rId14"/>
-    <p:sldId id="282" r:id="rId15"/>
+    <p:sldId id="280" r:id="rId12"/>
+    <p:sldId id="281" r:id="rId13"/>
+    <p:sldId id="282" r:id="rId14"/>
   </p:sldIdLst>
   <p:sldSz cx="9144000" cy="6858000" type="screen4x3"/>
   <p:notesSz cx="6858000" cy="9144000"/>
@@ -1074,385 +1073,6 @@
 </p:notesMaster>
 </file>
 
-<file path=ppt/notesSlides/notesSlide1.xml><?xml version="1.0" encoding="utf-8"?>
-<p:notes xmlns:a="http://schemas.openxmlformats.org/drawingml/2006/main" xmlns:r="http://schemas.openxmlformats.org/officeDocument/2006/relationships" xmlns:p="http://schemas.openxmlformats.org/presentationml/2006/main">
-  <p:cSld>
-    <p:spTree>
-      <p:nvGrpSpPr>
-        <p:cNvPr id="1" name=""/>
-        <p:cNvGrpSpPr/>
-        <p:nvPr/>
-      </p:nvGrpSpPr>
-      <p:grpSpPr>
-        <a:xfrm>
-          <a:off x="0" y="0"/>
-          <a:ext cx="0" cy="0"/>
-          <a:chOff x="0" y="0"/>
-          <a:chExt cx="0" cy="0"/>
-        </a:xfrm>
-      </p:grpSpPr>
-      <p:sp>
-        <p:nvSpPr>
-          <p:cNvPr id="2" name="Folienbildplatzhalter 1"/>
-          <p:cNvSpPr>
-            <a:spLocks noGrp="1" noRot="1" noChangeAspect="1"/>
-          </p:cNvSpPr>
-          <p:nvPr>
-            <p:ph type="sldImg"/>
-          </p:nvPr>
-        </p:nvSpPr>
-        <p:spPr/>
-      </p:sp>
-      <p:sp>
-        <p:nvSpPr>
-          <p:cNvPr id="3" name="Notizenplatzhalter 2"/>
-          <p:cNvSpPr>
-            <a:spLocks noGrp="1"/>
-          </p:cNvSpPr>
-          <p:nvPr>
-            <p:ph type="body" idx="1"/>
-          </p:nvPr>
-        </p:nvSpPr>
-        <p:spPr/>
-        <p:txBody>
-          <a:bodyPr>
-            <a:normAutofit/>
-          </a:bodyPr>
-          <a:lstStyle/>
-          <a:p>
-            <a:r>
-              <a:rPr lang="en-GB" dirty="0" smtClean="0"/>
-              <a:t>Die </a:t>
-            </a:r>
-            <a:r>
-              <a:rPr lang="en-GB" dirty="0" err="1" smtClean="0"/>
-              <a:t>angegebene</a:t>
-            </a:r>
-            <a:r>
-              <a:rPr lang="en-GB" baseline="0" dirty="0" smtClean="0"/>
-              <a:t> </a:t>
-            </a:r>
-            <a:r>
-              <a:rPr lang="en-GB" baseline="0" dirty="0" err="1" smtClean="0"/>
-              <a:t>Gliederung</a:t>
-            </a:r>
-            <a:r>
-              <a:rPr lang="en-GB" baseline="0" dirty="0" smtClean="0"/>
-              <a:t> </a:t>
-            </a:r>
-            <a:r>
-              <a:rPr lang="en-GB" baseline="0" dirty="0" err="1" smtClean="0"/>
-              <a:t>ist</a:t>
-            </a:r>
-            <a:r>
-              <a:rPr lang="en-GB" baseline="0" dirty="0" smtClean="0"/>
-              <a:t> </a:t>
-            </a:r>
-            <a:r>
-              <a:rPr lang="en-GB" baseline="0" dirty="0" err="1" smtClean="0"/>
-              <a:t>nur</a:t>
-            </a:r>
-            <a:r>
-              <a:rPr lang="en-GB" baseline="0" dirty="0" smtClean="0"/>
-              <a:t> </a:t>
-            </a:r>
-            <a:r>
-              <a:rPr lang="en-GB" baseline="0" dirty="0" err="1" smtClean="0"/>
-              <a:t>ein</a:t>
-            </a:r>
-            <a:r>
-              <a:rPr lang="en-GB" baseline="0" dirty="0" smtClean="0"/>
-              <a:t> </a:t>
-            </a:r>
-            <a:r>
-              <a:rPr lang="en-GB" baseline="0" dirty="0" err="1" smtClean="0"/>
-              <a:t>Beispiel</a:t>
-            </a:r>
-            <a:r>
-              <a:rPr lang="en-GB" baseline="0" dirty="0" smtClean="0"/>
-              <a:t>, </a:t>
-            </a:r>
-            <a:r>
-              <a:rPr lang="en-GB" baseline="0" dirty="0" err="1" smtClean="0"/>
-              <a:t>sie</a:t>
-            </a:r>
-            <a:r>
-              <a:rPr lang="en-GB" baseline="0" dirty="0" smtClean="0"/>
-              <a:t> muss an die </a:t>
-            </a:r>
-            <a:r>
-              <a:rPr lang="en-GB" baseline="0" dirty="0" err="1" smtClean="0"/>
-              <a:t>Folien</a:t>
-            </a:r>
-            <a:r>
-              <a:rPr lang="en-GB" baseline="0" dirty="0" smtClean="0"/>
-              <a:t> </a:t>
-            </a:r>
-            <a:r>
-              <a:rPr lang="en-GB" baseline="0" dirty="0" err="1" smtClean="0"/>
-              <a:t>angepasst</a:t>
-            </a:r>
-            <a:r>
-              <a:rPr lang="en-GB" baseline="0" dirty="0" smtClean="0"/>
-              <a:t> </a:t>
-            </a:r>
-            <a:r>
-              <a:rPr lang="en-GB" baseline="0" dirty="0" err="1" smtClean="0"/>
-              <a:t>werden</a:t>
-            </a:r>
-            <a:r>
-              <a:rPr lang="en-GB" baseline="0" dirty="0" smtClean="0"/>
-              <a:t> (s. https://sdqweb.ipd.kit.edu/wiki/Vortragshinweise) und </a:t>
-            </a:r>
-            <a:r>
-              <a:rPr lang="en-GB" baseline="0" dirty="0" err="1" smtClean="0"/>
-              <a:t>manuell</a:t>
-            </a:r>
-            <a:r>
-              <a:rPr lang="en-GB" baseline="0" dirty="0" smtClean="0"/>
-              <a:t> auf </a:t>
-            </a:r>
-            <a:r>
-              <a:rPr lang="en-GB" baseline="0" dirty="0" err="1" smtClean="0"/>
-              <a:t>jede</a:t>
-            </a:r>
-            <a:r>
-              <a:rPr lang="en-GB" baseline="0" dirty="0" smtClean="0"/>
-              <a:t> </a:t>
-            </a:r>
-            <a:r>
-              <a:rPr lang="en-GB" baseline="0" dirty="0" err="1" smtClean="0"/>
-              <a:t>Folie</a:t>
-            </a:r>
-            <a:r>
-              <a:rPr lang="en-GB" baseline="0" dirty="0" smtClean="0"/>
-              <a:t> </a:t>
-            </a:r>
-            <a:r>
-              <a:rPr lang="en-GB" baseline="0" dirty="0" err="1" smtClean="0"/>
-              <a:t>kopiert</a:t>
-            </a:r>
-            <a:r>
-              <a:rPr lang="en-GB" baseline="0" dirty="0" smtClean="0"/>
-              <a:t> </a:t>
-            </a:r>
-            <a:r>
-              <a:rPr lang="en-GB" baseline="0" dirty="0" err="1" smtClean="0"/>
-              <a:t>werden</a:t>
-            </a:r>
-            <a:r>
-              <a:rPr lang="en-GB" baseline="0" dirty="0" smtClean="0"/>
-              <a:t>. Das </a:t>
-            </a:r>
-            <a:r>
-              <a:rPr lang="en-GB" baseline="0" dirty="0" err="1" smtClean="0"/>
-              <a:t>aktuelle</a:t>
-            </a:r>
-            <a:r>
-              <a:rPr lang="en-GB" baseline="0" dirty="0" smtClean="0"/>
-              <a:t> </a:t>
-            </a:r>
-            <a:r>
-              <a:rPr lang="en-GB" baseline="0" dirty="0" err="1" smtClean="0"/>
-              <a:t>Kapitel</a:t>
-            </a:r>
-            <a:r>
-              <a:rPr lang="en-GB" baseline="0" dirty="0" smtClean="0"/>
-              <a:t> </a:t>
-            </a:r>
-            <a:r>
-              <a:rPr lang="en-GB" baseline="0" dirty="0" err="1" smtClean="0"/>
-              <a:t>sollte</a:t>
-            </a:r>
-            <a:r>
-              <a:rPr lang="en-GB" baseline="0" dirty="0" smtClean="0"/>
-              <a:t> </a:t>
-            </a:r>
-            <a:r>
-              <a:rPr lang="en-GB" baseline="0" dirty="0" err="1" smtClean="0"/>
-              <a:t>fettgedruckt</a:t>
-            </a:r>
-            <a:r>
-              <a:rPr lang="en-GB" baseline="0" dirty="0" smtClean="0"/>
-              <a:t> </a:t>
-            </a:r>
-            <a:r>
-              <a:rPr lang="en-GB" baseline="0" dirty="0" err="1" smtClean="0"/>
-              <a:t>werden</a:t>
-            </a:r>
-            <a:r>
-              <a:rPr lang="en-GB" baseline="0" dirty="0" smtClean="0"/>
-              <a:t>. Den </a:t>
-            </a:r>
-            <a:r>
-              <a:rPr lang="en-GB" baseline="0" dirty="0" err="1" smtClean="0"/>
-              <a:t>Abstand</a:t>
-            </a:r>
-            <a:r>
-              <a:rPr lang="en-GB" baseline="0" dirty="0" smtClean="0"/>
-              <a:t> </a:t>
-            </a:r>
-            <a:r>
-              <a:rPr lang="en-GB" baseline="0" dirty="0" err="1" smtClean="0"/>
-              <a:t>der</a:t>
-            </a:r>
-            <a:r>
-              <a:rPr lang="en-GB" baseline="0" dirty="0" smtClean="0"/>
-              <a:t> </a:t>
-            </a:r>
-            <a:r>
-              <a:rPr lang="en-GB" baseline="0" dirty="0" err="1" smtClean="0"/>
-              <a:t>Worte</a:t>
-            </a:r>
-            <a:r>
-              <a:rPr lang="en-GB" baseline="0" dirty="0" smtClean="0"/>
-              <a:t> </a:t>
-            </a:r>
-            <a:r>
-              <a:rPr lang="en-GB" baseline="0" dirty="0" err="1" smtClean="0"/>
-              <a:t>kann</a:t>
-            </a:r>
-            <a:r>
-              <a:rPr lang="en-GB" baseline="0" dirty="0" smtClean="0"/>
-              <a:t> man gut in PowerPoint an </a:t>
-            </a:r>
-            <a:r>
-              <a:rPr lang="en-GB" baseline="0" dirty="0" err="1" smtClean="0"/>
-              <a:t>andere</a:t>
-            </a:r>
-            <a:r>
-              <a:rPr lang="en-GB" baseline="0" dirty="0" smtClean="0"/>
-              <a:t> </a:t>
-            </a:r>
-            <a:r>
-              <a:rPr lang="en-GB" baseline="0" dirty="0" err="1" smtClean="0"/>
-              <a:t>Wortlängen</a:t>
-            </a:r>
-            <a:r>
-              <a:rPr lang="en-GB" baseline="0" dirty="0" smtClean="0"/>
-              <a:t> </a:t>
-            </a:r>
-            <a:r>
-              <a:rPr lang="en-GB" baseline="0" dirty="0" err="1" smtClean="0"/>
-              <a:t>anpassen</a:t>
-            </a:r>
-            <a:r>
-              <a:rPr lang="en-GB" baseline="0" dirty="0" smtClean="0"/>
-              <a:t>, </a:t>
-            </a:r>
-            <a:r>
-              <a:rPr lang="en-GB" baseline="0" dirty="0" err="1" smtClean="0"/>
-              <a:t>dazu</a:t>
-            </a:r>
-            <a:r>
-              <a:rPr lang="en-GB" baseline="0" dirty="0" smtClean="0"/>
-              <a:t> </a:t>
-            </a:r>
-            <a:r>
-              <a:rPr lang="en-GB" baseline="0" dirty="0" err="1" smtClean="0"/>
-              <a:t>alle</a:t>
-            </a:r>
-            <a:r>
-              <a:rPr lang="en-GB" baseline="0" dirty="0" smtClean="0"/>
-              <a:t> </a:t>
-            </a:r>
-            <a:r>
-              <a:rPr lang="en-GB" baseline="0" dirty="0" err="1" smtClean="0"/>
-              <a:t>Worte</a:t>
-            </a:r>
-            <a:r>
-              <a:rPr lang="en-GB" baseline="0" dirty="0" smtClean="0"/>
-              <a:t> und die </a:t>
-            </a:r>
-            <a:r>
-              <a:rPr lang="en-GB" baseline="0" dirty="0" err="1" smtClean="0"/>
-              <a:t>Pfeile</a:t>
-            </a:r>
-            <a:r>
-              <a:rPr lang="en-GB" baseline="0" dirty="0" smtClean="0"/>
-              <a:t> </a:t>
-            </a:r>
-            <a:r>
-              <a:rPr lang="en-GB" baseline="0" dirty="0" err="1" smtClean="0"/>
-              <a:t>markieren</a:t>
-            </a:r>
-            <a:r>
-              <a:rPr lang="en-GB" baseline="0" dirty="0" smtClean="0"/>
-              <a:t> und “</a:t>
-            </a:r>
-            <a:r>
-              <a:rPr lang="en-GB" baseline="0" dirty="0" err="1" smtClean="0"/>
-              <a:t>Anordnen</a:t>
-            </a:r>
-            <a:r>
-              <a:rPr lang="en-GB" baseline="0" dirty="0" smtClean="0"/>
-              <a:t> -&gt; </a:t>
-            </a:r>
-            <a:r>
-              <a:rPr lang="en-GB" baseline="0" dirty="0" err="1" smtClean="0"/>
-              <a:t>Ausrichten</a:t>
-            </a:r>
-            <a:r>
-              <a:rPr lang="en-GB" baseline="0" dirty="0" smtClean="0"/>
-              <a:t> -&gt; Horizontal </a:t>
-            </a:r>
-            <a:r>
-              <a:rPr lang="en-GB" baseline="0" dirty="0" err="1" smtClean="0"/>
-              <a:t>verteilen</a:t>
-            </a:r>
-            <a:r>
-              <a:rPr lang="en-GB" baseline="0" dirty="0" smtClean="0"/>
-              <a:t>”  </a:t>
-            </a:r>
-            <a:r>
-              <a:rPr lang="en-GB" baseline="0" dirty="0" err="1" smtClean="0"/>
-              <a:t>auswählen</a:t>
-            </a:r>
-            <a:r>
-              <a:rPr lang="en-GB" baseline="0" dirty="0" smtClean="0"/>
-              <a:t> (PowerPoint2007). </a:t>
-            </a:r>
-            <a:endParaRPr lang="en-GB" dirty="0"/>
-          </a:p>
-        </p:txBody>
-      </p:sp>
-      <p:sp>
-        <p:nvSpPr>
-          <p:cNvPr id="4" name="Foliennummernplatzhalter 3"/>
-          <p:cNvSpPr>
-            <a:spLocks noGrp="1"/>
-          </p:cNvSpPr>
-          <p:nvPr>
-            <p:ph type="sldNum" sz="quarter" idx="10"/>
-          </p:nvPr>
-        </p:nvSpPr>
-        <p:spPr/>
-        <p:txBody>
-          <a:bodyPr/>
-          <a:lstStyle/>
-          <a:p>
-            <a:fld id="{74ACB795-123D-4B41-ABB8-5412373C4490}" type="slidenum">
-              <a:rPr lang="en-GB" smtClean="0"/>
-              <a:pPr/>
-              <a:t>2</a:t>
-            </a:fld>
-            <a:endParaRPr lang="en-GB"/>
-          </a:p>
-        </p:txBody>
-      </p:sp>
-    </p:spTree>
-    <p:extLst>
-      <p:ext uri="{BB962C8B-B14F-4D97-AF65-F5344CB8AC3E}">
-        <p14:creationId xmlns:p14="http://schemas.microsoft.com/office/powerpoint/2010/main" val="528627548"/>
-      </p:ext>
-    </p:extLst>
-  </p:cSld>
-  <p:clrMapOvr>
-    <a:masterClrMapping/>
-  </p:clrMapOvr>
-</p:notes>
-</file>
-
 <file path=ppt/slideLayouts/slideLayout1.xml><?xml version="1.0" encoding="utf-8"?>
 <p:sldLayout xmlns:a="http://schemas.openxmlformats.org/drawingml/2006/main" xmlns:r="http://schemas.openxmlformats.org/officeDocument/2006/relationships" xmlns:p="http://schemas.openxmlformats.org/presentationml/2006/main" showMasterSp="0" type="title" preserve="1">
   <p:cSld name="Titelfolie">
@@ -4053,7 +3673,7 @@
               <a:pPr>
                 <a:defRPr/>
               </a:pPr>
-              <a:t>23.06.2015</a:t>
+              <a:t>25.06.2015</a:t>
             </a:fld>
             <a:endParaRPr lang="de-DE" sz="1000" dirty="0">
               <a:latin typeface="Arial" pitchFamily="34" charset="0"/>
@@ -4926,96 +4546,6 @@
       </p:sp>
       <p:pic>
         <p:nvPicPr>
-          <p:cNvPr id="7" name="Grafik 6"/>
-          <p:cNvPicPr>
-            <a:picLocks noChangeAspect="1"/>
-          </p:cNvPicPr>
-          <p:nvPr/>
-        </p:nvPicPr>
-        <p:blipFill>
-          <a:blip r:embed="rId2">
-            <a:extLst>
-              <a:ext uri="{28A0092B-C50C-407E-A947-70E740481C1C}">
-                <a14:useLocalDpi xmlns:a14="http://schemas.microsoft.com/office/drawing/2010/main" val="0"/>
-              </a:ext>
-            </a:extLst>
-          </a:blip>
-          <a:stretch>
-            <a:fillRect/>
-          </a:stretch>
-        </p:blipFill>
-        <p:spPr>
-          <a:xfrm>
-            <a:off x="2057400" y="381000"/>
-            <a:ext cx="4848606" cy="6858000"/>
-          </a:xfrm>
-          <a:prstGeom prst="rect">
-            <a:avLst/>
-          </a:prstGeom>
-        </p:spPr>
-      </p:pic>
-    </p:spTree>
-    <p:extLst>
-      <p:ext uri="{BB962C8B-B14F-4D97-AF65-F5344CB8AC3E}">
-        <p14:creationId xmlns:p14="http://schemas.microsoft.com/office/powerpoint/2010/main" val="412103643"/>
-      </p:ext>
-    </p:extLst>
-  </p:cSld>
-  <p:clrMapOvr>
-    <a:masterClrMapping/>
-  </p:clrMapOvr>
-  <p:timing>
-    <p:tnLst>
-      <p:par>
-        <p:cTn id="1" dur="indefinite" restart="never" nodeType="tmRoot"/>
-      </p:par>
-    </p:tnLst>
-  </p:timing>
-</p:sld>
-</file>
-
-<file path=ppt/slides/slide12.xml><?xml version="1.0" encoding="utf-8"?>
-<p:sld xmlns:a="http://schemas.openxmlformats.org/drawingml/2006/main" xmlns:r="http://schemas.openxmlformats.org/officeDocument/2006/relationships" xmlns:p="http://schemas.openxmlformats.org/presentationml/2006/main">
-  <p:cSld>
-    <p:spTree>
-      <p:nvGrpSpPr>
-        <p:cNvPr id="1" name=""/>
-        <p:cNvGrpSpPr/>
-        <p:nvPr/>
-      </p:nvGrpSpPr>
-      <p:grpSpPr>
-        <a:xfrm>
-          <a:off x="0" y="0"/>
-          <a:ext cx="0" cy="0"/>
-          <a:chOff x="0" y="0"/>
-          <a:chExt cx="0" cy="0"/>
-        </a:xfrm>
-      </p:grpSpPr>
-      <p:sp>
-        <p:nvSpPr>
-          <p:cNvPr id="4" name="Fußzeilenplatzhalter 3"/>
-          <p:cNvSpPr>
-            <a:spLocks noGrp="1"/>
-          </p:cNvSpPr>
-          <p:nvPr>
-            <p:ph type="ftr" sz="quarter" idx="10"/>
-          </p:nvPr>
-        </p:nvSpPr>
-        <p:spPr/>
-        <p:txBody>
-          <a:bodyPr/>
-          <a:lstStyle/>
-          <a:p>
-            <a:r>
-              <a:rPr lang="de-DE" smtClean="0"/>
-              <a:t>Leube Dane: Web Latenz im Transmission Control Protokoll</a:t>
-            </a:r>
-            <a:endParaRPr lang="de-DE" dirty="0"/>
-          </a:p>
-        </p:txBody>
-      </p:sp>
-      <p:pic>
-        <p:nvPicPr>
           <p:cNvPr id="6" name="Grafik 5"/>
           <p:cNvPicPr>
             <a:picLocks noChangeAspect="1"/>
@@ -5064,7 +4594,7 @@
 </p:sld>
 </file>
 
-<file path=ppt/slides/slide13.xml><?xml version="1.0" encoding="utf-8"?>
+<file path=ppt/slides/slide12.xml><?xml version="1.0" encoding="utf-8"?>
 <p:sld xmlns:a="http://schemas.openxmlformats.org/drawingml/2006/main" xmlns:r="http://schemas.openxmlformats.org/officeDocument/2006/relationships" xmlns:p="http://schemas.openxmlformats.org/presentationml/2006/main">
   <p:cSld>
     <p:spTree>
@@ -5254,7 +4784,7 @@
 </p:sld>
 </file>
 
-<file path=ppt/slides/slide14.xml><?xml version="1.0" encoding="utf-8"?>
+<file path=ppt/slides/slide13.xml><?xml version="1.0" encoding="utf-8"?>
 <p:sld xmlns:a="http://schemas.openxmlformats.org/drawingml/2006/main" xmlns:r="http://schemas.openxmlformats.org/officeDocument/2006/relationships" xmlns:p="http://schemas.openxmlformats.org/presentationml/2006/main">
   <p:cSld>
     <p:spTree>
@@ -5434,29 +4964,21 @@
           <a:lstStyle/>
           <a:p>
             <a:r>
-              <a:rPr lang="en-GB" dirty="0" smtClean="0"/>
-              <a:t>Web </a:t>
-            </a:r>
-            <a:r>
-              <a:rPr lang="en-GB" dirty="0" err="1" smtClean="0"/>
-              <a:t>Latenz</a:t>
-            </a:r>
-            <a:r>
-              <a:rPr lang="en-GB" dirty="0" smtClean="0"/>
-              <a:t>? </a:t>
-            </a:r>
-            <a:endParaRPr lang="en-GB" dirty="0"/>
-          </a:p>
-        </p:txBody>
-      </p:sp>
-      <p:sp>
-        <p:nvSpPr>
-          <p:cNvPr id="4" name="Fußzeilenplatzhalter 3"/>
+              <a:rPr lang="de-DE" dirty="0" smtClean="0"/>
+              <a:t>Agenda</a:t>
+            </a:r>
+            <a:endParaRPr lang="de-DE" dirty="0"/>
+          </a:p>
+        </p:txBody>
+      </p:sp>
+      <p:sp>
+        <p:nvSpPr>
+          <p:cNvPr id="3" name="Inhaltsplatzhalter 2"/>
           <p:cNvSpPr>
             <a:spLocks noGrp="1"/>
           </p:cNvSpPr>
           <p:nvPr>
-            <p:ph type="ftr" sz="quarter" idx="10"/>
+            <p:ph idx="1"/>
           </p:nvPr>
         </p:nvSpPr>
         <p:spPr/>
@@ -5466,128 +4988,64 @@
           <a:p>
             <a:r>
               <a:rPr lang="de-DE" dirty="0" smtClean="0"/>
-              <a:t>Dane Leube: </a:t>
-            </a:r>
+              <a:t>RTO </a:t>
+            </a:r>
+            <a:r>
+              <a:rPr lang="de-DE" dirty="0" smtClean="0">
+                <a:sym typeface="Wingdings" panose="05000000000000000000" pitchFamily="2" charset="2"/>
+              </a:rPr>
+              <a:t> RTT</a:t>
+            </a:r>
+            <a:endParaRPr lang="de-DE" dirty="0" smtClean="0"/>
+          </a:p>
+          <a:p>
+            <a:endParaRPr lang="de-DE" dirty="0" smtClean="0"/>
+          </a:p>
+          <a:p>
             <a:r>
               <a:rPr lang="de-DE" dirty="0" smtClean="0"/>
-              <a:t>Web Latenz im TCP Protokoll</a:t>
-            </a:r>
-            <a:r>
-              <a:rPr lang="de-DE" dirty="0"/>
-              <a:t/>
-            </a:r>
-            <a:br>
-              <a:rPr lang="de-DE" dirty="0"/>
-            </a:br>
+              <a:t>Zielsetzung</a:t>
+            </a:r>
+          </a:p>
+          <a:p>
+            <a:r>
+              <a:rPr lang="de-DE" dirty="0" smtClean="0"/>
+              <a:t>Lösungsansätze des Papers</a:t>
+            </a:r>
+          </a:p>
+          <a:p>
+            <a:r>
+              <a:rPr lang="de-DE" dirty="0" smtClean="0"/>
+              <a:t>Diskussion der Ansätze</a:t>
+            </a:r>
+          </a:p>
+          <a:p>
+            <a:r>
+              <a:rPr lang="de-DE" dirty="0" smtClean="0"/>
+              <a:t>Fazit</a:t>
+            </a:r>
             <a:endParaRPr lang="de-DE" dirty="0"/>
           </a:p>
         </p:txBody>
       </p:sp>
       <p:sp>
         <p:nvSpPr>
-          <p:cNvPr id="3" name="Textfeld 2"/>
-          <p:cNvSpPr txBox="1"/>
-          <p:nvPr/>
-        </p:nvSpPr>
-        <p:spPr>
-          <a:xfrm>
-            <a:off x="2057400" y="2133600"/>
-            <a:ext cx="4267200" cy="2031325"/>
-          </a:xfrm>
-          <a:prstGeom prst="rect">
-            <a:avLst/>
-          </a:prstGeom>
-          <a:noFill/>
-        </p:spPr>
-        <p:txBody>
-          <a:bodyPr wrap="square" rtlCol="0">
-            <a:spAutoFit/>
-          </a:bodyPr>
+          <p:cNvPr id="4" name="Fußzeilenplatzhalter 3"/>
+          <p:cNvSpPr>
+            <a:spLocks noGrp="1"/>
+          </p:cNvSpPr>
+          <p:nvPr>
+            <p:ph type="ftr" sz="quarter" idx="10"/>
+          </p:nvPr>
+        </p:nvSpPr>
+        <p:spPr/>
+        <p:txBody>
+          <a:bodyPr/>
           <a:lstStyle/>
           <a:p>
             <a:r>
               <a:rPr lang="de-DE" dirty="0" smtClean="0"/>
-              <a:t>Amazon hat berechnet, dass pro </a:t>
-            </a:r>
-            <a:r>
-              <a:rPr lang="de-DE" dirty="0" smtClean="0"/>
-              <a:t>100 </a:t>
-            </a:r>
-            <a:r>
-              <a:rPr lang="de-DE" dirty="0" err="1" smtClean="0"/>
-              <a:t>ms</a:t>
-            </a:r>
-            <a:r>
-              <a:rPr lang="de-DE" dirty="0" smtClean="0"/>
-              <a:t> Verzögerung </a:t>
-            </a:r>
-            <a:r>
-              <a:rPr lang="de-DE" dirty="0" smtClean="0"/>
-              <a:t>ca. 1% an Umsatz verloren geht</a:t>
-            </a:r>
-            <a:r>
-              <a:rPr lang="de-DE" dirty="0" smtClean="0"/>
-              <a:t>.</a:t>
-            </a:r>
-          </a:p>
-          <a:p>
-            <a:endParaRPr lang="de-DE" dirty="0" smtClean="0"/>
-          </a:p>
-          <a:p>
-            <a:endParaRPr lang="de-DE" dirty="0"/>
-          </a:p>
-          <a:p>
-            <a:r>
-              <a:rPr lang="de-DE" dirty="0" smtClean="0"/>
-              <a:t>Quelle: </a:t>
-            </a:r>
-            <a:r>
-              <a:rPr lang="de-DE" dirty="0" err="1" smtClean="0"/>
-              <a:t>Reducing</a:t>
-            </a:r>
-            <a:r>
-              <a:rPr lang="de-DE" dirty="0" smtClean="0"/>
-              <a:t> Web </a:t>
-            </a:r>
-            <a:r>
-              <a:rPr lang="de-DE" dirty="0" err="1" smtClean="0"/>
-              <a:t>Latency</a:t>
-            </a:r>
-            <a:r>
-              <a:rPr lang="de-DE" dirty="0" smtClean="0"/>
-              <a:t>: </a:t>
-            </a:r>
-            <a:r>
-              <a:rPr lang="de-DE" dirty="0" err="1" smtClean="0"/>
-              <a:t>the</a:t>
-            </a:r>
-            <a:r>
-              <a:rPr lang="de-DE" dirty="0" smtClean="0"/>
-              <a:t> </a:t>
-            </a:r>
-            <a:r>
-              <a:rPr lang="de-DE" dirty="0" err="1" smtClean="0"/>
-              <a:t>Virtue</a:t>
-            </a:r>
-            <a:r>
-              <a:rPr lang="de-DE" dirty="0" smtClean="0"/>
-              <a:t> </a:t>
-            </a:r>
-            <a:r>
-              <a:rPr lang="de-DE" dirty="0" err="1" smtClean="0"/>
-              <a:t>of</a:t>
-            </a:r>
-            <a:r>
-              <a:rPr lang="de-DE" dirty="0" smtClean="0"/>
-              <a:t> </a:t>
-            </a:r>
-            <a:r>
-              <a:rPr lang="de-DE" dirty="0" err="1" smtClean="0"/>
-              <a:t>Gentle</a:t>
-            </a:r>
-            <a:r>
-              <a:rPr lang="de-DE" dirty="0" smtClean="0"/>
-              <a:t> Aggression</a:t>
+              <a:t>Leube Dane: Web Latenz im TCP Protokoll</a:t>
             </a:r>
             <a:endParaRPr lang="de-DE" dirty="0"/>
           </a:p>
@@ -5596,7 +5054,7 @@
     </p:spTree>
     <p:extLst>
       <p:ext uri="{BB962C8B-B14F-4D97-AF65-F5344CB8AC3E}">
-        <p14:creationId xmlns:p14="http://schemas.microsoft.com/office/powerpoint/2010/main" val="1028804093"/>
+        <p14:creationId xmlns:p14="http://schemas.microsoft.com/office/powerpoint/2010/main" val="723932544"/>
       </p:ext>
     </p:extLst>
   </p:cSld>
@@ -5647,147 +5105,6 @@
           <a:p>
             <a:r>
               <a:rPr lang="de-DE" dirty="0" smtClean="0"/>
-              <a:t>Agenda</a:t>
-            </a:r>
-            <a:endParaRPr lang="de-DE" dirty="0"/>
-          </a:p>
-        </p:txBody>
-      </p:sp>
-      <p:sp>
-        <p:nvSpPr>
-          <p:cNvPr id="3" name="Inhaltsplatzhalter 2"/>
-          <p:cNvSpPr>
-            <a:spLocks noGrp="1"/>
-          </p:cNvSpPr>
-          <p:nvPr>
-            <p:ph idx="1"/>
-          </p:nvPr>
-        </p:nvSpPr>
-        <p:spPr/>
-        <p:txBody>
-          <a:bodyPr/>
-          <a:lstStyle/>
-          <a:p>
-            <a:r>
-              <a:rPr lang="de-DE" dirty="0" smtClean="0"/>
-              <a:t>Wichtige Begriffe</a:t>
-            </a:r>
-            <a:endParaRPr lang="de-DE" dirty="0" smtClean="0"/>
-          </a:p>
-          <a:p>
-            <a:r>
-              <a:rPr lang="de-DE" dirty="0" smtClean="0"/>
-              <a:t>Problemanalyse</a:t>
-            </a:r>
-          </a:p>
-          <a:p>
-            <a:r>
-              <a:rPr lang="de-DE" dirty="0" smtClean="0"/>
-              <a:t>Zielsetzung</a:t>
-            </a:r>
-          </a:p>
-          <a:p>
-            <a:r>
-              <a:rPr lang="de-DE" dirty="0" smtClean="0"/>
-              <a:t>Lösungsansätze des Papers</a:t>
-            </a:r>
-          </a:p>
-          <a:p>
-            <a:r>
-              <a:rPr lang="de-DE" dirty="0" smtClean="0"/>
-              <a:t>Diskussion </a:t>
-            </a:r>
-            <a:r>
-              <a:rPr lang="de-DE" dirty="0" smtClean="0"/>
-              <a:t>der Ansätze</a:t>
-            </a:r>
-          </a:p>
-          <a:p>
-            <a:r>
-              <a:rPr lang="de-DE" dirty="0" smtClean="0"/>
-              <a:t>Fazit</a:t>
-            </a:r>
-            <a:endParaRPr lang="de-DE" dirty="0"/>
-          </a:p>
-        </p:txBody>
-      </p:sp>
-      <p:sp>
-        <p:nvSpPr>
-          <p:cNvPr id="4" name="Fußzeilenplatzhalter 3"/>
-          <p:cNvSpPr>
-            <a:spLocks noGrp="1"/>
-          </p:cNvSpPr>
-          <p:nvPr>
-            <p:ph type="ftr" sz="quarter" idx="10"/>
-          </p:nvPr>
-        </p:nvSpPr>
-        <p:spPr/>
-        <p:txBody>
-          <a:bodyPr/>
-          <a:lstStyle/>
-          <a:p>
-            <a:r>
-              <a:rPr lang="de-DE" dirty="0" smtClean="0"/>
-              <a:t>Leube Dane: Web Latenz im TCP Protokoll</a:t>
-            </a:r>
-            <a:endParaRPr lang="de-DE" dirty="0"/>
-          </a:p>
-        </p:txBody>
-      </p:sp>
-    </p:spTree>
-    <p:extLst>
-      <p:ext uri="{BB962C8B-B14F-4D97-AF65-F5344CB8AC3E}">
-        <p14:creationId xmlns:p14="http://schemas.microsoft.com/office/powerpoint/2010/main" val="723932544"/>
-      </p:ext>
-    </p:extLst>
-  </p:cSld>
-  <p:clrMapOvr>
-    <a:masterClrMapping/>
-  </p:clrMapOvr>
-  <p:timing>
-    <p:tnLst>
-      <p:par>
-        <p:cTn id="1" dur="indefinite" restart="never" nodeType="tmRoot"/>
-      </p:par>
-    </p:tnLst>
-  </p:timing>
-</p:sld>
-</file>
-
-<file path=ppt/slides/slide4.xml><?xml version="1.0" encoding="utf-8"?>
-<p:sld xmlns:a="http://schemas.openxmlformats.org/drawingml/2006/main" xmlns:r="http://schemas.openxmlformats.org/officeDocument/2006/relationships" xmlns:p="http://schemas.openxmlformats.org/presentationml/2006/main">
-  <p:cSld>
-    <p:spTree>
-      <p:nvGrpSpPr>
-        <p:cNvPr id="1" name=""/>
-        <p:cNvGrpSpPr/>
-        <p:nvPr/>
-      </p:nvGrpSpPr>
-      <p:grpSpPr>
-        <a:xfrm>
-          <a:off x="0" y="0"/>
-          <a:ext cx="0" cy="0"/>
-          <a:chOff x="0" y="0"/>
-          <a:chExt cx="0" cy="0"/>
-        </a:xfrm>
-      </p:grpSpPr>
-      <p:sp>
-        <p:nvSpPr>
-          <p:cNvPr id="2" name="Titel 1"/>
-          <p:cNvSpPr>
-            <a:spLocks noGrp="1"/>
-          </p:cNvSpPr>
-          <p:nvPr>
-            <p:ph type="title"/>
-          </p:nvPr>
-        </p:nvSpPr>
-        <p:spPr/>
-        <p:txBody>
-          <a:bodyPr/>
-          <a:lstStyle/>
-          <a:p>
-            <a:r>
-              <a:rPr lang="de-DE" dirty="0" smtClean="0"/>
               <a:t>Wichtige Begriffe für die Arbeit</a:t>
             </a:r>
             <a:endParaRPr lang="de-DE" dirty="0"/>
@@ -5897,7 +5214,7 @@
 </p:sld>
 </file>
 
-<file path=ppt/slides/slide5.xml><?xml version="1.0" encoding="utf-8"?>
+<file path=ppt/slides/slide4.xml><?xml version="1.0" encoding="utf-8"?>
 <p:sld xmlns:a="http://schemas.openxmlformats.org/drawingml/2006/main" xmlns:r="http://schemas.openxmlformats.org/officeDocument/2006/relationships" xmlns:p="http://schemas.openxmlformats.org/presentationml/2006/main">
   <p:cSld>
     <p:spTree>
@@ -6010,7 +5327,7 @@
 </p:sld>
 </file>
 
-<file path=ppt/slides/slide6.xml><?xml version="1.0" encoding="utf-8"?>
+<file path=ppt/slides/slide5.xml><?xml version="1.0" encoding="utf-8"?>
 <p:sld xmlns:a="http://schemas.openxmlformats.org/drawingml/2006/main" xmlns:r="http://schemas.openxmlformats.org/officeDocument/2006/relationships" xmlns:p="http://schemas.openxmlformats.org/presentationml/2006/main">
   <p:cSld>
     <p:spTree>
@@ -6174,6 +5491,109 @@
 </p:sld>
 </file>
 
+<file path=ppt/slides/slide6.xml><?xml version="1.0" encoding="utf-8"?>
+<p:sld xmlns:a="http://schemas.openxmlformats.org/drawingml/2006/main" xmlns:r="http://schemas.openxmlformats.org/officeDocument/2006/relationships" xmlns:p="http://schemas.openxmlformats.org/presentationml/2006/main">
+  <p:cSld>
+    <p:spTree>
+      <p:nvGrpSpPr>
+        <p:cNvPr id="1" name=""/>
+        <p:cNvGrpSpPr/>
+        <p:nvPr/>
+      </p:nvGrpSpPr>
+      <p:grpSpPr>
+        <a:xfrm>
+          <a:off x="0" y="0"/>
+          <a:ext cx="0" cy="0"/>
+          <a:chOff x="0" y="0"/>
+          <a:chExt cx="0" cy="0"/>
+        </a:xfrm>
+      </p:grpSpPr>
+      <p:sp>
+        <p:nvSpPr>
+          <p:cNvPr id="2" name="Titel 1"/>
+          <p:cNvSpPr>
+            <a:spLocks noGrp="1"/>
+          </p:cNvSpPr>
+          <p:nvPr>
+            <p:ph type="title"/>
+          </p:nvPr>
+        </p:nvSpPr>
+        <p:spPr/>
+        <p:txBody>
+          <a:bodyPr/>
+          <a:lstStyle/>
+          <a:p>
+            <a:r>
+              <a:rPr lang="de-DE" dirty="0" smtClean="0"/>
+              <a:t>Zielsetzung</a:t>
+            </a:r>
+            <a:endParaRPr lang="de-DE" dirty="0"/>
+          </a:p>
+        </p:txBody>
+      </p:sp>
+      <p:sp>
+        <p:nvSpPr>
+          <p:cNvPr id="3" name="Inhaltsplatzhalter 2"/>
+          <p:cNvSpPr>
+            <a:spLocks noGrp="1"/>
+          </p:cNvSpPr>
+          <p:nvPr>
+            <p:ph idx="1"/>
+          </p:nvPr>
+        </p:nvSpPr>
+        <p:spPr/>
+        <p:txBody>
+          <a:bodyPr/>
+          <a:lstStyle/>
+          <a:p>
+            <a:r>
+              <a:rPr lang="de-DE" dirty="0" err="1" smtClean="0"/>
+              <a:t>Retransmission</a:t>
+            </a:r>
+            <a:r>
+              <a:rPr lang="de-DE" dirty="0" smtClean="0"/>
+              <a:t> innerhalb einer RTT</a:t>
+            </a:r>
+            <a:endParaRPr lang="de-DE" dirty="0"/>
+          </a:p>
+        </p:txBody>
+      </p:sp>
+      <p:sp>
+        <p:nvSpPr>
+          <p:cNvPr id="4" name="Fußzeilenplatzhalter 3"/>
+          <p:cNvSpPr>
+            <a:spLocks noGrp="1"/>
+          </p:cNvSpPr>
+          <p:nvPr>
+            <p:ph type="ftr" sz="quarter" idx="10"/>
+          </p:nvPr>
+        </p:nvSpPr>
+        <p:spPr/>
+        <p:txBody>
+          <a:bodyPr/>
+          <a:lstStyle/>
+          <a:p>
+            <a:r>
+              <a:rPr lang="de-DE" smtClean="0"/>
+              <a:t>Leube Dane: Web Latenz im Transmission Control Protokoll</a:t>
+            </a:r>
+            <a:endParaRPr lang="de-DE" dirty="0"/>
+          </a:p>
+        </p:txBody>
+      </p:sp>
+    </p:spTree>
+    <p:extLst>
+      <p:ext uri="{BB962C8B-B14F-4D97-AF65-F5344CB8AC3E}">
+        <p14:creationId xmlns:p14="http://schemas.microsoft.com/office/powerpoint/2010/main" val="1744123464"/>
+      </p:ext>
+    </p:extLst>
+  </p:cSld>
+  <p:clrMapOvr>
+    <a:masterClrMapping/>
+  </p:clrMapOvr>
+</p:sld>
+</file>
+
 <file path=ppt/slides/slide7.xml><?xml version="1.0" encoding="utf-8"?>
 <p:sld xmlns:a="http://schemas.openxmlformats.org/drawingml/2006/main" xmlns:r="http://schemas.openxmlformats.org/officeDocument/2006/relationships" xmlns:p="http://schemas.openxmlformats.org/presentationml/2006/main">
   <p:cSld>
@@ -6208,7 +5628,7 @@
           <a:p>
             <a:r>
               <a:rPr lang="de-DE" dirty="0" smtClean="0"/>
-              <a:t>Zielsetzung</a:t>
+              <a:t>Lösungsansätze</a:t>
             </a:r>
             <a:endParaRPr lang="de-DE" dirty="0"/>
           </a:p>
@@ -6230,117 +5650,9 @@
           <a:lstStyle/>
           <a:p>
             <a:r>
-              <a:rPr lang="de-DE" dirty="0" err="1" smtClean="0"/>
-              <a:t>Retransmission</a:t>
-            </a:r>
-            <a:r>
               <a:rPr lang="de-DE" dirty="0" smtClean="0"/>
-              <a:t> innerhalb einer RTT</a:t>
-            </a:r>
-            <a:endParaRPr lang="de-DE" dirty="0"/>
-          </a:p>
-        </p:txBody>
-      </p:sp>
-      <p:sp>
-        <p:nvSpPr>
-          <p:cNvPr id="4" name="Fußzeilenplatzhalter 3"/>
-          <p:cNvSpPr>
-            <a:spLocks noGrp="1"/>
-          </p:cNvSpPr>
-          <p:nvPr>
-            <p:ph type="ftr" sz="quarter" idx="10"/>
-          </p:nvPr>
-        </p:nvSpPr>
-        <p:spPr/>
-        <p:txBody>
-          <a:bodyPr/>
-          <a:lstStyle/>
-          <a:p>
-            <a:r>
-              <a:rPr lang="de-DE" smtClean="0"/>
-              <a:t>Leube Dane: Web Latenz im Transmission Control Protokoll</a:t>
-            </a:r>
-            <a:endParaRPr lang="de-DE" dirty="0"/>
-          </a:p>
-        </p:txBody>
-      </p:sp>
-    </p:spTree>
-    <p:extLst>
-      <p:ext uri="{BB962C8B-B14F-4D97-AF65-F5344CB8AC3E}">
-        <p14:creationId xmlns:p14="http://schemas.microsoft.com/office/powerpoint/2010/main" val="1744123464"/>
-      </p:ext>
-    </p:extLst>
-  </p:cSld>
-  <p:clrMapOvr>
-    <a:masterClrMapping/>
-  </p:clrMapOvr>
-</p:sld>
-</file>
-
-<file path=ppt/slides/slide8.xml><?xml version="1.0" encoding="utf-8"?>
-<p:sld xmlns:a="http://schemas.openxmlformats.org/drawingml/2006/main" xmlns:r="http://schemas.openxmlformats.org/officeDocument/2006/relationships" xmlns:p="http://schemas.openxmlformats.org/presentationml/2006/main">
-  <p:cSld>
-    <p:spTree>
-      <p:nvGrpSpPr>
-        <p:cNvPr id="1" name=""/>
-        <p:cNvGrpSpPr/>
-        <p:nvPr/>
-      </p:nvGrpSpPr>
-      <p:grpSpPr>
-        <a:xfrm>
-          <a:off x="0" y="0"/>
-          <a:ext cx="0" cy="0"/>
-          <a:chOff x="0" y="0"/>
-          <a:chExt cx="0" cy="0"/>
-        </a:xfrm>
-      </p:grpSpPr>
-      <p:sp>
-        <p:nvSpPr>
-          <p:cNvPr id="2" name="Titel 1"/>
-          <p:cNvSpPr>
-            <a:spLocks noGrp="1"/>
-          </p:cNvSpPr>
-          <p:nvPr>
-            <p:ph type="title"/>
-          </p:nvPr>
-        </p:nvSpPr>
-        <p:spPr/>
-        <p:txBody>
-          <a:bodyPr/>
-          <a:lstStyle/>
-          <a:p>
-            <a:r>
-              <a:rPr lang="de-DE" dirty="0" smtClean="0"/>
-              <a:t>Lösungsansätze</a:t>
-            </a:r>
-            <a:endParaRPr lang="de-DE" dirty="0"/>
-          </a:p>
-        </p:txBody>
-      </p:sp>
-      <p:sp>
-        <p:nvSpPr>
-          <p:cNvPr id="3" name="Inhaltsplatzhalter 2"/>
-          <p:cNvSpPr>
-            <a:spLocks noGrp="1"/>
-          </p:cNvSpPr>
-          <p:nvPr>
-            <p:ph idx="1"/>
-          </p:nvPr>
-        </p:nvSpPr>
-        <p:spPr/>
-        <p:txBody>
-          <a:bodyPr/>
-          <a:lstStyle/>
-          <a:p>
-            <a:r>
-              <a:rPr lang="de-DE" dirty="0" smtClean="0"/>
-              <a:t>Aus dem </a:t>
-            </a:r>
-            <a:r>
-              <a:rPr lang="de-DE" dirty="0" smtClean="0"/>
-              <a:t>Paper:</a:t>
-            </a:r>
-            <a:endParaRPr lang="de-DE" dirty="0" smtClean="0"/>
+              <a:t>Aus dem Paper:</a:t>
+            </a:r>
           </a:p>
           <a:p>
             <a:r>
@@ -6408,7 +5720,7 @@
 </p:sld>
 </file>
 
-<file path=ppt/slides/slide9.xml><?xml version="1.0" encoding="utf-8"?>
+<file path=ppt/slides/slide8.xml><?xml version="1.0" encoding="utf-8"?>
 <p:sld xmlns:a="http://schemas.openxmlformats.org/drawingml/2006/main" xmlns:r="http://schemas.openxmlformats.org/officeDocument/2006/relationships" xmlns:p="http://schemas.openxmlformats.org/presentationml/2006/main">
   <p:cSld>
     <p:spTree>
@@ -6482,6 +5794,96 @@
     <p:extLst>
       <p:ext uri="{BB962C8B-B14F-4D97-AF65-F5344CB8AC3E}">
         <p14:creationId xmlns:p14="http://schemas.microsoft.com/office/powerpoint/2010/main" val="42749528"/>
+      </p:ext>
+    </p:extLst>
+  </p:cSld>
+  <p:clrMapOvr>
+    <a:masterClrMapping/>
+  </p:clrMapOvr>
+  <p:timing>
+    <p:tnLst>
+      <p:par>
+        <p:cTn id="1" dur="indefinite" restart="never" nodeType="tmRoot"/>
+      </p:par>
+    </p:tnLst>
+  </p:timing>
+</p:sld>
+</file>
+
+<file path=ppt/slides/slide9.xml><?xml version="1.0" encoding="utf-8"?>
+<p:sld xmlns:a="http://schemas.openxmlformats.org/drawingml/2006/main" xmlns:r="http://schemas.openxmlformats.org/officeDocument/2006/relationships" xmlns:p="http://schemas.openxmlformats.org/presentationml/2006/main">
+  <p:cSld>
+    <p:spTree>
+      <p:nvGrpSpPr>
+        <p:cNvPr id="1" name=""/>
+        <p:cNvGrpSpPr/>
+        <p:nvPr/>
+      </p:nvGrpSpPr>
+      <p:grpSpPr>
+        <a:xfrm>
+          <a:off x="0" y="0"/>
+          <a:ext cx="0" cy="0"/>
+          <a:chOff x="0" y="0"/>
+          <a:chExt cx="0" cy="0"/>
+        </a:xfrm>
+      </p:grpSpPr>
+      <p:sp>
+        <p:nvSpPr>
+          <p:cNvPr id="4" name="Fußzeilenplatzhalter 3"/>
+          <p:cNvSpPr>
+            <a:spLocks noGrp="1"/>
+          </p:cNvSpPr>
+          <p:nvPr>
+            <p:ph type="ftr" sz="quarter" idx="10"/>
+          </p:nvPr>
+        </p:nvSpPr>
+        <p:spPr/>
+        <p:txBody>
+          <a:bodyPr/>
+          <a:lstStyle/>
+          <a:p>
+            <a:r>
+              <a:rPr lang="de-DE" smtClean="0"/>
+              <a:t>Leube Dane: Web Latenz im Transmission Control Protokoll</a:t>
+            </a:r>
+            <a:endParaRPr lang="de-DE" dirty="0"/>
+          </a:p>
+        </p:txBody>
+      </p:sp>
+      <p:pic>
+        <p:nvPicPr>
+          <p:cNvPr id="7" name="Grafik 6"/>
+          <p:cNvPicPr>
+            <a:picLocks noChangeAspect="1"/>
+          </p:cNvPicPr>
+          <p:nvPr/>
+        </p:nvPicPr>
+        <p:blipFill>
+          <a:blip r:embed="rId2">
+            <a:extLst>
+              <a:ext uri="{28A0092B-C50C-407E-A947-70E740481C1C}">
+                <a14:useLocalDpi xmlns:a14="http://schemas.microsoft.com/office/drawing/2010/main" val="0"/>
+              </a:ext>
+            </a:extLst>
+          </a:blip>
+          <a:stretch>
+            <a:fillRect/>
+          </a:stretch>
+        </p:blipFill>
+        <p:spPr>
+          <a:xfrm>
+            <a:off x="2057400" y="381000"/>
+            <a:ext cx="4848606" cy="6858000"/>
+          </a:xfrm>
+          <a:prstGeom prst="rect">
+            <a:avLst/>
+          </a:prstGeom>
+        </p:spPr>
+      </p:pic>
+    </p:spTree>
+    <p:extLst>
+      <p:ext uri="{BB962C8B-B14F-4D97-AF65-F5344CB8AC3E}">
+        <p14:creationId xmlns:p14="http://schemas.microsoft.com/office/powerpoint/2010/main" val="412103643"/>
       </p:ext>
     </p:extLst>
   </p:cSld>

</xml_diff>